<commit_message>
added viualization for validation
</commit_message>
<xml_diff>
--- a/misc/Segmentation.pptx
+++ b/misc/Segmentation.pptx
@@ -20,11 +20,14 @@
     <p:sldId id="267" r:id="rId14"/>
     <p:sldId id="269" r:id="rId15"/>
     <p:sldId id="270" r:id="rId16"/>
-    <p:sldId id="271" r:id="rId17"/>
-    <p:sldId id="272" r:id="rId18"/>
-    <p:sldId id="273" r:id="rId19"/>
-    <p:sldId id="275" r:id="rId20"/>
-    <p:sldId id="274" r:id="rId21"/>
+    <p:sldId id="276" r:id="rId17"/>
+    <p:sldId id="271" r:id="rId18"/>
+    <p:sldId id="272" r:id="rId19"/>
+    <p:sldId id="273" r:id="rId20"/>
+    <p:sldId id="275" r:id="rId21"/>
+    <p:sldId id="277" r:id="rId22"/>
+    <p:sldId id="278" r:id="rId23"/>
+    <p:sldId id="274" r:id="rId24"/>
   </p:sldIdLst>
   <p:sldSz cx="12192000" cy="6858000"/>
   <p:notesSz cx="6858000" cy="9144000"/>
@@ -278,7 +281,7 @@
           <a:p>
             <a:fld id="{5ECBD1B4-F142-490E-A4AB-4FD38A88171A}" type="datetimeFigureOut">
               <a:rPr lang="en-US" smtClean="0"/>
-              <a:t>8/14/2021</a:t>
+              <a:t>8/18/2021</a:t>
             </a:fld>
             <a:endParaRPr lang="en-US"/>
           </a:p>
@@ -476,7 +479,7 @@
           <a:p>
             <a:fld id="{5ECBD1B4-F142-490E-A4AB-4FD38A88171A}" type="datetimeFigureOut">
               <a:rPr lang="en-US" smtClean="0"/>
-              <a:t>8/14/2021</a:t>
+              <a:t>8/18/2021</a:t>
             </a:fld>
             <a:endParaRPr lang="en-US"/>
           </a:p>
@@ -684,7 +687,7 @@
           <a:p>
             <a:fld id="{5ECBD1B4-F142-490E-A4AB-4FD38A88171A}" type="datetimeFigureOut">
               <a:rPr lang="en-US" smtClean="0"/>
-              <a:t>8/14/2021</a:t>
+              <a:t>8/18/2021</a:t>
             </a:fld>
             <a:endParaRPr lang="en-US"/>
           </a:p>
@@ -882,7 +885,7 @@
           <a:p>
             <a:fld id="{5ECBD1B4-F142-490E-A4AB-4FD38A88171A}" type="datetimeFigureOut">
               <a:rPr lang="en-US" smtClean="0"/>
-              <a:t>8/14/2021</a:t>
+              <a:t>8/18/2021</a:t>
             </a:fld>
             <a:endParaRPr lang="en-US"/>
           </a:p>
@@ -1157,7 +1160,7 @@
           <a:p>
             <a:fld id="{5ECBD1B4-F142-490E-A4AB-4FD38A88171A}" type="datetimeFigureOut">
               <a:rPr lang="en-US" smtClean="0"/>
-              <a:t>8/14/2021</a:t>
+              <a:t>8/18/2021</a:t>
             </a:fld>
             <a:endParaRPr lang="en-US"/>
           </a:p>
@@ -1422,7 +1425,7 @@
           <a:p>
             <a:fld id="{5ECBD1B4-F142-490E-A4AB-4FD38A88171A}" type="datetimeFigureOut">
               <a:rPr lang="en-US" smtClean="0"/>
-              <a:t>8/14/2021</a:t>
+              <a:t>8/18/2021</a:t>
             </a:fld>
             <a:endParaRPr lang="en-US"/>
           </a:p>
@@ -1834,7 +1837,7 @@
           <a:p>
             <a:fld id="{5ECBD1B4-F142-490E-A4AB-4FD38A88171A}" type="datetimeFigureOut">
               <a:rPr lang="en-US" smtClean="0"/>
-              <a:t>8/14/2021</a:t>
+              <a:t>8/18/2021</a:t>
             </a:fld>
             <a:endParaRPr lang="en-US"/>
           </a:p>
@@ -1975,7 +1978,7 @@
           <a:p>
             <a:fld id="{5ECBD1B4-F142-490E-A4AB-4FD38A88171A}" type="datetimeFigureOut">
               <a:rPr lang="en-US" smtClean="0"/>
-              <a:t>8/14/2021</a:t>
+              <a:t>8/18/2021</a:t>
             </a:fld>
             <a:endParaRPr lang="en-US"/>
           </a:p>
@@ -2088,7 +2091,7 @@
           <a:p>
             <a:fld id="{5ECBD1B4-F142-490E-A4AB-4FD38A88171A}" type="datetimeFigureOut">
               <a:rPr lang="en-US" smtClean="0"/>
-              <a:t>8/14/2021</a:t>
+              <a:t>8/18/2021</a:t>
             </a:fld>
             <a:endParaRPr lang="en-US"/>
           </a:p>
@@ -2399,7 +2402,7 @@
           <a:p>
             <a:fld id="{5ECBD1B4-F142-490E-A4AB-4FD38A88171A}" type="datetimeFigureOut">
               <a:rPr lang="en-US" smtClean="0"/>
-              <a:t>8/14/2021</a:t>
+              <a:t>8/18/2021</a:t>
             </a:fld>
             <a:endParaRPr lang="en-US"/>
           </a:p>
@@ -2687,7 +2690,7 @@
           <a:p>
             <a:fld id="{5ECBD1B4-F142-490E-A4AB-4FD38A88171A}" type="datetimeFigureOut">
               <a:rPr lang="en-US" smtClean="0"/>
-              <a:t>8/14/2021</a:t>
+              <a:t>8/18/2021</a:t>
             </a:fld>
             <a:endParaRPr lang="en-US"/>
           </a:p>
@@ -2928,7 +2931,7 @@
           <a:p>
             <a:fld id="{5ECBD1B4-F142-490E-A4AB-4FD38A88171A}" type="datetimeFigureOut">
               <a:rPr lang="en-US" smtClean="0"/>
-              <a:t>8/14/2021</a:t>
+              <a:t>8/18/2021</a:t>
             </a:fld>
             <a:endParaRPr lang="en-US"/>
           </a:p>
@@ -5477,6 +5480,14 @@
 <file path=ppt/slides/slide16.xml><?xml version="1.0" encoding="utf-8"?>
 <p:sld xmlns:a="http://schemas.openxmlformats.org/drawingml/2006/main" xmlns:r="http://schemas.openxmlformats.org/officeDocument/2006/relationships" xmlns:p="http://schemas.openxmlformats.org/presentationml/2006/main">
   <p:cSld>
+    <p:bg>
+      <p:bgPr>
+        <a:solidFill>
+          <a:srgbClr val="FF0000"/>
+        </a:solidFill>
+        <a:effectLst/>
+      </p:bgPr>
+    </p:bg>
     <p:spTree>
       <p:nvGrpSpPr>
         <p:cNvPr id="1" name=""/>
@@ -5496,7 +5507,7 @@
           <p:cNvPr id="2" name="Title 1">
             <a:extLst>
               <a:ext uri="{FF2B5EF4-FFF2-40B4-BE49-F238E27FC236}">
-                <a16:creationId xmlns:a16="http://schemas.microsoft.com/office/drawing/2014/main" id="{5BC090C0-44FD-411A-BE7E-92FFC7576652}"/>
+                <a16:creationId xmlns:a16="http://schemas.microsoft.com/office/drawing/2014/main" id="{D0229BAF-55A0-4CD7-AC0B-EF9A78C684C1}"/>
               </a:ext>
             </a:extLst>
           </p:cNvPr>
@@ -5507,6 +5518,71 @@
             <p:ph type="title"/>
           </p:nvPr>
         </p:nvSpPr>
+        <p:spPr>
+          <a:xfrm>
+            <a:off x="838199" y="365125"/>
+            <a:ext cx="11235431" cy="5804856"/>
+          </a:xfrm>
+        </p:spPr>
+        <p:txBody>
+          <a:bodyPr>
+            <a:normAutofit/>
+          </a:bodyPr>
+          <a:lstStyle/>
+          <a:p>
+            <a:r>
+              <a:rPr lang="en-US" sz="13800" b="1" dirty="0"/>
+              <a:t>NEW 11.8.2021</a:t>
+            </a:r>
+          </a:p>
+        </p:txBody>
+      </p:sp>
+    </p:spTree>
+    <p:extLst>
+      <p:ext uri="{BB962C8B-B14F-4D97-AF65-F5344CB8AC3E}">
+        <p14:creationId xmlns:p14="http://schemas.microsoft.com/office/powerpoint/2010/main" val="38964486"/>
+      </p:ext>
+    </p:extLst>
+  </p:cSld>
+  <p:clrMapOvr>
+    <a:masterClrMapping/>
+  </p:clrMapOvr>
+</p:sld>
+</file>
+
+<file path=ppt/slides/slide17.xml><?xml version="1.0" encoding="utf-8"?>
+<p:sld xmlns:a="http://schemas.openxmlformats.org/drawingml/2006/main" xmlns:r="http://schemas.openxmlformats.org/officeDocument/2006/relationships" xmlns:p="http://schemas.openxmlformats.org/presentationml/2006/main">
+  <p:cSld>
+    <p:spTree>
+      <p:nvGrpSpPr>
+        <p:cNvPr id="1" name=""/>
+        <p:cNvGrpSpPr/>
+        <p:nvPr/>
+      </p:nvGrpSpPr>
+      <p:grpSpPr>
+        <a:xfrm>
+          <a:off x="0" y="0"/>
+          <a:ext cx="0" cy="0"/>
+          <a:chOff x="0" y="0"/>
+          <a:chExt cx="0" cy="0"/>
+        </a:xfrm>
+      </p:grpSpPr>
+      <p:sp>
+        <p:nvSpPr>
+          <p:cNvPr id="2" name="Title 1">
+            <a:extLst>
+              <a:ext uri="{FF2B5EF4-FFF2-40B4-BE49-F238E27FC236}">
+                <a16:creationId xmlns:a16="http://schemas.microsoft.com/office/drawing/2014/main" id="{5BC090C0-44FD-411A-BE7E-92FFC7576652}"/>
+              </a:ext>
+            </a:extLst>
+          </p:cNvPr>
+          <p:cNvSpPr>
+            <a:spLocks noGrp="1"/>
+          </p:cNvSpPr>
+          <p:nvPr>
+            <p:ph type="title"/>
+          </p:nvPr>
+        </p:nvSpPr>
         <p:spPr/>
         <p:txBody>
           <a:bodyPr/>
@@ -5542,7 +5618,7 @@
           <a:p>
             <a:r>
               <a:rPr lang="en-US" dirty="0"/>
-              <a:t>BIG FLOWCHART NEEDED </a:t>
+              <a:t>BIG FLOWCHART NEEDED (TO DO) </a:t>
             </a:r>
           </a:p>
         </p:txBody>
@@ -5560,7 +5636,7 @@
 </p:sld>
 </file>
 
-<file path=ppt/slides/slide17.xml><?xml version="1.0" encoding="utf-8"?>
+<file path=ppt/slides/slide18.xml><?xml version="1.0" encoding="utf-8"?>
 <p:sld xmlns:a="http://schemas.openxmlformats.org/drawingml/2006/main" xmlns:r="http://schemas.openxmlformats.org/officeDocument/2006/relationships" xmlns:p="http://schemas.openxmlformats.org/presentationml/2006/main">
   <p:cSld>
     <p:spTree>
@@ -6159,7 +6235,7 @@
 </p:sld>
 </file>
 
-<file path=ppt/slides/slide18.xml><?xml version="1.0" encoding="utf-8"?>
+<file path=ppt/slides/slide19.xml><?xml version="1.0" encoding="utf-8"?>
 <p:sld xmlns:a="http://schemas.openxmlformats.org/drawingml/2006/main" xmlns:r="http://schemas.openxmlformats.org/officeDocument/2006/relationships" xmlns:p="http://schemas.openxmlformats.org/presentationml/2006/main">
   <p:cSld>
     <p:spTree>
@@ -7601,7 +7677,171 @@
 </p:sld>
 </file>
 
-<file path=ppt/slides/slide19.xml><?xml version="1.0" encoding="utf-8"?>
+<file path=ppt/slides/slide2.xml><?xml version="1.0" encoding="utf-8"?>
+<p:sld xmlns:a="http://schemas.openxmlformats.org/drawingml/2006/main" xmlns:r="http://schemas.openxmlformats.org/officeDocument/2006/relationships" xmlns:p="http://schemas.openxmlformats.org/presentationml/2006/main">
+  <p:cSld>
+    <p:spTree>
+      <p:nvGrpSpPr>
+        <p:cNvPr id="1" name=""/>
+        <p:cNvGrpSpPr/>
+        <p:nvPr/>
+      </p:nvGrpSpPr>
+      <p:grpSpPr>
+        <a:xfrm>
+          <a:off x="0" y="0"/>
+          <a:ext cx="0" cy="0"/>
+          <a:chOff x="0" y="0"/>
+          <a:chExt cx="0" cy="0"/>
+        </a:xfrm>
+      </p:grpSpPr>
+      <p:sp>
+        <p:nvSpPr>
+          <p:cNvPr id="2" name="Title 1">
+            <a:extLst>
+              <a:ext uri="{FF2B5EF4-FFF2-40B4-BE49-F238E27FC236}">
+                <a16:creationId xmlns:a16="http://schemas.microsoft.com/office/drawing/2014/main" id="{3D88F8DB-958F-495B-B72A-EBA554A1F4FD}"/>
+              </a:ext>
+            </a:extLst>
+          </p:cNvPr>
+          <p:cNvSpPr>
+            <a:spLocks noGrp="1"/>
+          </p:cNvSpPr>
+          <p:nvPr>
+            <p:ph type="title"/>
+          </p:nvPr>
+        </p:nvSpPr>
+        <p:spPr/>
+        <p:txBody>
+          <a:bodyPr/>
+          <a:lstStyle/>
+          <a:p>
+            <a:r>
+              <a:rPr lang="en-US" dirty="0"/>
+              <a:t>.STL to .</a:t>
+            </a:r>
+            <a:r>
+              <a:rPr lang="en-US" dirty="0" err="1"/>
+              <a:t>binvox</a:t>
+            </a:r>
+            <a:endParaRPr lang="en-US" dirty="0"/>
+          </a:p>
+        </p:txBody>
+      </p:sp>
+      <p:sp>
+        <p:nvSpPr>
+          <p:cNvPr id="3" name="Content Placeholder 2">
+            <a:extLst>
+              <a:ext uri="{FF2B5EF4-FFF2-40B4-BE49-F238E27FC236}">
+                <a16:creationId xmlns:a16="http://schemas.microsoft.com/office/drawing/2014/main" id="{47DCAFA1-6BAA-414C-9877-3A77365D7E4C}"/>
+              </a:ext>
+            </a:extLst>
+          </p:cNvPr>
+          <p:cNvSpPr>
+            <a:spLocks noGrp="1"/>
+          </p:cNvSpPr>
+          <p:nvPr>
+            <p:ph idx="1"/>
+          </p:nvPr>
+        </p:nvSpPr>
+        <p:spPr/>
+        <p:txBody>
+          <a:bodyPr>
+            <a:normAutofit/>
+          </a:bodyPr>
+          <a:lstStyle/>
+          <a:p>
+            <a:r>
+              <a:rPr lang="en-US" dirty="0"/>
+              <a:t>Max .</a:t>
+            </a:r>
+            <a:r>
+              <a:rPr lang="en-US" dirty="0" err="1"/>
+              <a:t>binvox</a:t>
+            </a:r>
+            <a:r>
+              <a:rPr lang="en-US" dirty="0"/>
+              <a:t> dim is 512x512x512 = squeezing everything into 512 voxels</a:t>
+            </a:r>
+          </a:p>
+          <a:p>
+            <a:r>
+              <a:rPr lang="en-US" dirty="0"/>
+              <a:t>Loss of resolution if a feature is less than 1/512 of max length</a:t>
+            </a:r>
+          </a:p>
+          <a:p>
+            <a:pPr lvl="1"/>
+            <a:r>
+              <a:rPr lang="en-US" dirty="0"/>
+              <a:t>Otherwise increase of resolution	</a:t>
+            </a:r>
+          </a:p>
+          <a:p>
+            <a:endParaRPr lang="en-US" dirty="0"/>
+          </a:p>
+          <a:p>
+            <a:r>
+              <a:rPr lang="en-US" dirty="0"/>
+              <a:t>How to increase .</a:t>
+            </a:r>
+            <a:r>
+              <a:rPr lang="en-US" dirty="0" err="1"/>
+              <a:t>binvox</a:t>
+            </a:r>
+            <a:r>
+              <a:rPr lang="en-US" dirty="0"/>
+              <a:t> dim?	</a:t>
+            </a:r>
+          </a:p>
+          <a:p>
+            <a:pPr lvl="1"/>
+            <a:r>
+              <a:rPr lang="en-US" dirty="0"/>
+              <a:t>Crack binvox.exe / decompile – not a good idea / 99 $ (max 4200 voxels)</a:t>
+            </a:r>
+          </a:p>
+          <a:p>
+            <a:pPr lvl="1"/>
+            <a:r>
+              <a:rPr lang="en-US" dirty="0"/>
+              <a:t>Segment STL into parts – then 512 </a:t>
+            </a:r>
+            <a:r>
+              <a:rPr lang="en-US" dirty="0" err="1"/>
+              <a:t>binvox</a:t>
+            </a:r>
+            <a:endParaRPr lang="en-US" dirty="0"/>
+          </a:p>
+          <a:p>
+            <a:pPr lvl="2"/>
+            <a:r>
+              <a:rPr lang="en-US" dirty="0"/>
+              <a:t>Deleting vertices ?</a:t>
+            </a:r>
+          </a:p>
+          <a:p>
+            <a:pPr lvl="2"/>
+            <a:r>
+              <a:rPr lang="en-US" dirty="0"/>
+              <a:t>Complicated , idk</a:t>
+            </a:r>
+          </a:p>
+        </p:txBody>
+      </p:sp>
+    </p:spTree>
+    <p:extLst>
+      <p:ext uri="{BB962C8B-B14F-4D97-AF65-F5344CB8AC3E}">
+        <p14:creationId xmlns:p14="http://schemas.microsoft.com/office/powerpoint/2010/main" val="4242319206"/>
+      </p:ext>
+    </p:extLst>
+  </p:cSld>
+  <p:clrMapOvr>
+    <a:masterClrMapping/>
+  </p:clrMapOvr>
+</p:sld>
+</file>
+
+<file path=ppt/slides/slide20.xml><?xml version="1.0" encoding="utf-8"?>
 <p:sld xmlns:a="http://schemas.openxmlformats.org/drawingml/2006/main" xmlns:r="http://schemas.openxmlformats.org/officeDocument/2006/relationships" xmlns:p="http://schemas.openxmlformats.org/presentationml/2006/main">
   <p:cSld>
     <p:spTree>
@@ -8115,6 +8355,41 @@
           </a:p>
         </p:txBody>
       </p:sp>
+      <p:sp>
+        <p:nvSpPr>
+          <p:cNvPr id="3" name="TextBox 2">
+            <a:extLst>
+              <a:ext uri="{FF2B5EF4-FFF2-40B4-BE49-F238E27FC236}">
+                <a16:creationId xmlns:a16="http://schemas.microsoft.com/office/drawing/2014/main" id="{82FCE8C4-646E-4269-B2BD-D7E1DA6CD1D7}"/>
+              </a:ext>
+            </a:extLst>
+          </p:cNvPr>
+          <p:cNvSpPr txBox="1"/>
+          <p:nvPr/>
+        </p:nvSpPr>
+        <p:spPr>
+          <a:xfrm>
+            <a:off x="8016536" y="4705165"/>
+            <a:ext cx="2911876" cy="769441"/>
+          </a:xfrm>
+          <a:prstGeom prst="rect">
+            <a:avLst/>
+          </a:prstGeom>
+          <a:noFill/>
+        </p:spPr>
+        <p:txBody>
+          <a:bodyPr wrap="square" rtlCol="0">
+            <a:spAutoFit/>
+          </a:bodyPr>
+          <a:lstStyle/>
+          <a:p>
+            <a:r>
+              <a:rPr lang="en-US" sz="4400" dirty="0"/>
+              <a:t>IS POSSIBLE</a:t>
+            </a:r>
+          </a:p>
+        </p:txBody>
+      </p:sp>
     </p:spTree>
     <p:extLst>
       <p:ext uri="{BB962C8B-B14F-4D97-AF65-F5344CB8AC3E}">
@@ -8128,7 +8403,7 @@
 </p:sld>
 </file>
 
-<file path=ppt/slides/slide2.xml><?xml version="1.0" encoding="utf-8"?>
+<file path=ppt/slides/slide21.xml><?xml version="1.0" encoding="utf-8"?>
 <p:sld xmlns:a="http://schemas.openxmlformats.org/drawingml/2006/main" xmlns:r="http://schemas.openxmlformats.org/officeDocument/2006/relationships" xmlns:p="http://schemas.openxmlformats.org/presentationml/2006/main">
   <p:cSld>
     <p:spTree>
@@ -8150,7 +8425,7 @@
           <p:cNvPr id="2" name="Title 1">
             <a:extLst>
               <a:ext uri="{FF2B5EF4-FFF2-40B4-BE49-F238E27FC236}">
-                <a16:creationId xmlns:a16="http://schemas.microsoft.com/office/drawing/2014/main" id="{3D88F8DB-958F-495B-B72A-EBA554A1F4FD}"/>
+                <a16:creationId xmlns:a16="http://schemas.microsoft.com/office/drawing/2014/main" id="{4BACDBB2-9E77-4169-9A29-8C77E4AF66EB}"/>
               </a:ext>
             </a:extLst>
           </p:cNvPr>
@@ -8168,11 +8443,13 @@
           <a:p>
             <a:r>
               <a:rPr lang="en-US" dirty="0"/>
-              <a:t>.STL to .</a:t>
-            </a:r>
-            <a:r>
-              <a:rPr lang="en-US" dirty="0" err="1"/>
-              <a:t>binvox</a:t>
+              <a:t>Small achievements </a:t>
+            </a:r>
+            <a:r>
+              <a:rPr lang="en-US" dirty="0">
+                <a:sym typeface="Wingdings" panose="05000000000000000000" pitchFamily="2" charset="2"/>
+              </a:rPr>
+              <a:t></a:t>
             </a:r>
             <a:endParaRPr lang="en-US" dirty="0"/>
           </a:p>
@@ -8183,7 +8460,7 @@
           <p:cNvPr id="3" name="Content Placeholder 2">
             <a:extLst>
               <a:ext uri="{FF2B5EF4-FFF2-40B4-BE49-F238E27FC236}">
-                <a16:creationId xmlns:a16="http://schemas.microsoft.com/office/drawing/2014/main" id="{47DCAFA1-6BAA-414C-9877-3A77365D7E4C}"/>
+                <a16:creationId xmlns:a16="http://schemas.microsoft.com/office/drawing/2014/main" id="{E7FB5825-17D2-4385-863B-25A875798D0E}"/>
               </a:ext>
             </a:extLst>
           </p:cNvPr>
@@ -8196,85 +8473,18 @@
         </p:nvSpPr>
         <p:spPr/>
         <p:txBody>
-          <a:bodyPr>
-            <a:normAutofit/>
-          </a:bodyPr>
+          <a:bodyPr/>
           <a:lstStyle/>
           <a:p>
             <a:r>
               <a:rPr lang="en-US" dirty="0"/>
-              <a:t>Max .</a:t>
-            </a:r>
-            <a:r>
-              <a:rPr lang="en-US" dirty="0" err="1"/>
-              <a:t>binvox</a:t>
-            </a:r>
+              <a:t>Solved Deprecated version problem</a:t>
+            </a:r>
+          </a:p>
+          <a:p>
             <a:r>
               <a:rPr lang="en-US" dirty="0"/>
-              <a:t> dim is 512x512x512 = squeezing everything into 512 voxels</a:t>
-            </a:r>
-          </a:p>
-          <a:p>
-            <a:r>
-              <a:rPr lang="en-US" dirty="0"/>
-              <a:t>Loss of resolution if a feature is less than 1/512 of max length</a:t>
-            </a:r>
-          </a:p>
-          <a:p>
-            <a:pPr lvl="1"/>
-            <a:r>
-              <a:rPr lang="en-US" dirty="0"/>
-              <a:t>Otherwise increase of resolution	</a:t>
-            </a:r>
-          </a:p>
-          <a:p>
-            <a:endParaRPr lang="en-US" dirty="0"/>
-          </a:p>
-          <a:p>
-            <a:r>
-              <a:rPr lang="en-US" dirty="0"/>
-              <a:t>How to increase .</a:t>
-            </a:r>
-            <a:r>
-              <a:rPr lang="en-US" dirty="0" err="1"/>
-              <a:t>binvox</a:t>
-            </a:r>
-            <a:r>
-              <a:rPr lang="en-US" dirty="0"/>
-              <a:t> dim?	</a:t>
-            </a:r>
-          </a:p>
-          <a:p>
-            <a:pPr lvl="1"/>
-            <a:r>
-              <a:rPr lang="en-US" dirty="0"/>
-              <a:t>Crack binvox.exe / decompile – not a good idea / 99 $ (max 4200 voxels)</a:t>
-            </a:r>
-          </a:p>
-          <a:p>
-            <a:pPr lvl="1"/>
-            <a:r>
-              <a:rPr lang="en-US" dirty="0"/>
-              <a:t>Segment STL into parts – then 512 </a:t>
-            </a:r>
-            <a:r>
-              <a:rPr lang="en-US" dirty="0" err="1"/>
-              <a:t>binvox</a:t>
-            </a:r>
-            <a:endParaRPr lang="en-US" dirty="0"/>
-          </a:p>
-          <a:p>
-            <a:pPr lvl="2"/>
-            <a:r>
-              <a:rPr lang="en-US" dirty="0"/>
-              <a:t>Deleting vertices ?</a:t>
-            </a:r>
-          </a:p>
-          <a:p>
-            <a:pPr lvl="2"/>
-            <a:r>
-              <a:rPr lang="en-US" dirty="0"/>
-              <a:t>Complicated , idk</a:t>
+              <a:t>Updated all libs to newest version</a:t>
             </a:r>
           </a:p>
         </p:txBody>
@@ -8282,7 +8492,7 @@
     </p:spTree>
     <p:extLst>
       <p:ext uri="{BB962C8B-B14F-4D97-AF65-F5344CB8AC3E}">
-        <p14:creationId xmlns:p14="http://schemas.microsoft.com/office/powerpoint/2010/main" val="4242319206"/>
+        <p14:creationId xmlns:p14="http://schemas.microsoft.com/office/powerpoint/2010/main" val="2950025197"/>
       </p:ext>
     </p:extLst>
   </p:cSld>
@@ -8292,7 +8502,7 @@
 </p:sld>
 </file>
 
-<file path=ppt/slides/slide20.xml><?xml version="1.0" encoding="utf-8"?>
+<file path=ppt/slides/slide22.xml><?xml version="1.0" encoding="utf-8"?>
 <p:sld xmlns:a="http://schemas.openxmlformats.org/drawingml/2006/main" xmlns:r="http://schemas.openxmlformats.org/officeDocument/2006/relationships" xmlns:p="http://schemas.openxmlformats.org/presentationml/2006/main">
   <p:cSld>
     <p:spTree>
@@ -8314,7 +8524,7 @@
           <p:cNvPr id="2" name="Title 1">
             <a:extLst>
               <a:ext uri="{FF2B5EF4-FFF2-40B4-BE49-F238E27FC236}">
-                <a16:creationId xmlns:a16="http://schemas.microsoft.com/office/drawing/2014/main" id="{23CE64A4-2F53-4216-9156-486DB696E979}"/>
+                <a16:creationId xmlns:a16="http://schemas.microsoft.com/office/drawing/2014/main" id="{ACA19EFB-4E33-4B05-A45C-925EB6B7FEC5}"/>
               </a:ext>
             </a:extLst>
           </p:cNvPr>
@@ -8330,7 +8540,10 @@
           <a:bodyPr/>
           <a:lstStyle/>
           <a:p>
-            <a:endParaRPr lang="en-US"/>
+            <a:r>
+              <a:rPr lang="en-US" dirty="0"/>
+              <a:t>IDEAS</a:t>
+            </a:r>
           </a:p>
         </p:txBody>
       </p:sp>
@@ -8339,7 +8552,7 @@
           <p:cNvPr id="3" name="Content Placeholder 2">
             <a:extLst>
               <a:ext uri="{FF2B5EF4-FFF2-40B4-BE49-F238E27FC236}">
-                <a16:creationId xmlns:a16="http://schemas.microsoft.com/office/drawing/2014/main" id="{1CBB42E1-138C-4CDF-8B82-DB0034D78385}"/>
+                <a16:creationId xmlns:a16="http://schemas.microsoft.com/office/drawing/2014/main" id="{568247AE-88F2-457B-8CE1-5C8EC5FDDE7B}"/>
               </a:ext>
             </a:extLst>
           </p:cNvPr>
@@ -8355,7 +8568,123 @@
           <a:bodyPr/>
           <a:lstStyle/>
           <a:p>
-            <a:endParaRPr lang="en-US"/>
+            <a:r>
+              <a:rPr lang="en-US" dirty="0"/>
+              <a:t>Time optimization</a:t>
+            </a:r>
+          </a:p>
+          <a:p>
+            <a:r>
+              <a:rPr lang="en-US" dirty="0"/>
+              <a:t>Small scale test to validate results</a:t>
+            </a:r>
+          </a:p>
+          <a:p>
+            <a:endParaRPr lang="en-US" dirty="0"/>
+          </a:p>
+          <a:p>
+            <a:endParaRPr lang="en-US" dirty="0"/>
+          </a:p>
+          <a:p>
+            <a:r>
+              <a:rPr lang="en-US" dirty="0"/>
+              <a:t>DO NOT CHANGE ALL .CPU TO. GPU !!!</a:t>
+            </a:r>
+          </a:p>
+          <a:p>
+            <a:endParaRPr lang="en-US" dirty="0"/>
+          </a:p>
+        </p:txBody>
+      </p:sp>
+    </p:spTree>
+    <p:extLst>
+      <p:ext uri="{BB962C8B-B14F-4D97-AF65-F5344CB8AC3E}">
+        <p14:creationId xmlns:p14="http://schemas.microsoft.com/office/powerpoint/2010/main" val="10256787"/>
+      </p:ext>
+    </p:extLst>
+  </p:cSld>
+  <p:clrMapOvr>
+    <a:masterClrMapping/>
+  </p:clrMapOvr>
+</p:sld>
+</file>
+
+<file path=ppt/slides/slide23.xml><?xml version="1.0" encoding="utf-8"?>
+<p:sld xmlns:a="http://schemas.openxmlformats.org/drawingml/2006/main" xmlns:r="http://schemas.openxmlformats.org/officeDocument/2006/relationships" xmlns:p="http://schemas.openxmlformats.org/presentationml/2006/main">
+  <p:cSld>
+    <p:spTree>
+      <p:nvGrpSpPr>
+        <p:cNvPr id="1" name=""/>
+        <p:cNvGrpSpPr/>
+        <p:nvPr/>
+      </p:nvGrpSpPr>
+      <p:grpSpPr>
+        <a:xfrm>
+          <a:off x="0" y="0"/>
+          <a:ext cx="0" cy="0"/>
+          <a:chOff x="0" y="0"/>
+          <a:chExt cx="0" cy="0"/>
+        </a:xfrm>
+      </p:grpSpPr>
+      <p:sp>
+        <p:nvSpPr>
+          <p:cNvPr id="2" name="Title 1">
+            <a:extLst>
+              <a:ext uri="{FF2B5EF4-FFF2-40B4-BE49-F238E27FC236}">
+                <a16:creationId xmlns:a16="http://schemas.microsoft.com/office/drawing/2014/main" id="{23CE64A4-2F53-4216-9156-486DB696E979}"/>
+              </a:ext>
+            </a:extLst>
+          </p:cNvPr>
+          <p:cNvSpPr>
+            <a:spLocks noGrp="1"/>
+          </p:cNvSpPr>
+          <p:nvPr>
+            <p:ph type="title"/>
+          </p:nvPr>
+        </p:nvSpPr>
+        <p:spPr/>
+        <p:txBody>
+          <a:bodyPr/>
+          <a:lstStyle/>
+          <a:p>
+            <a:r>
+              <a:rPr lang="en-US" dirty="0"/>
+              <a:t>Questions</a:t>
+            </a:r>
+          </a:p>
+        </p:txBody>
+      </p:sp>
+      <p:sp>
+        <p:nvSpPr>
+          <p:cNvPr id="3" name="Content Placeholder 2">
+            <a:extLst>
+              <a:ext uri="{FF2B5EF4-FFF2-40B4-BE49-F238E27FC236}">
+                <a16:creationId xmlns:a16="http://schemas.microsoft.com/office/drawing/2014/main" id="{1CBB42E1-138C-4CDF-8B82-DB0034D78385}"/>
+              </a:ext>
+            </a:extLst>
+          </p:cNvPr>
+          <p:cNvSpPr>
+            <a:spLocks noGrp="1"/>
+          </p:cNvSpPr>
+          <p:nvPr>
+            <p:ph idx="1"/>
+          </p:nvPr>
+        </p:nvSpPr>
+        <p:spPr/>
+        <p:txBody>
+          <a:bodyPr/>
+          <a:lstStyle/>
+          <a:p>
+            <a:r>
+              <a:rPr lang="en-US" dirty="0"/>
+              <a:t>End result</a:t>
+            </a:r>
+          </a:p>
+          <a:p>
+            <a:r>
+              <a:rPr lang="en-US" dirty="0"/>
+              <a:t>Grant extension</a:t>
+            </a:r>
           </a:p>
         </p:txBody>
       </p:sp>

</xml_diff>

<commit_message>
pptx and full run
</commit_message>
<xml_diff>
--- a/misc/Segmentation.pptx
+++ b/misc/Segmentation.pptx
@@ -281,7 +281,7 @@
           <a:p>
             <a:fld id="{5ECBD1B4-F142-490E-A4AB-4FD38A88171A}" type="datetimeFigureOut">
               <a:rPr lang="en-US" smtClean="0"/>
-              <a:t>8/18/2021</a:t>
+              <a:t>8/19/2021</a:t>
             </a:fld>
             <a:endParaRPr lang="en-US"/>
           </a:p>
@@ -479,7 +479,7 @@
           <a:p>
             <a:fld id="{5ECBD1B4-F142-490E-A4AB-4FD38A88171A}" type="datetimeFigureOut">
               <a:rPr lang="en-US" smtClean="0"/>
-              <a:t>8/18/2021</a:t>
+              <a:t>8/19/2021</a:t>
             </a:fld>
             <a:endParaRPr lang="en-US"/>
           </a:p>
@@ -687,7 +687,7 @@
           <a:p>
             <a:fld id="{5ECBD1B4-F142-490E-A4AB-4FD38A88171A}" type="datetimeFigureOut">
               <a:rPr lang="en-US" smtClean="0"/>
-              <a:t>8/18/2021</a:t>
+              <a:t>8/19/2021</a:t>
             </a:fld>
             <a:endParaRPr lang="en-US"/>
           </a:p>
@@ -885,7 +885,7 @@
           <a:p>
             <a:fld id="{5ECBD1B4-F142-490E-A4AB-4FD38A88171A}" type="datetimeFigureOut">
               <a:rPr lang="en-US" smtClean="0"/>
-              <a:t>8/18/2021</a:t>
+              <a:t>8/19/2021</a:t>
             </a:fld>
             <a:endParaRPr lang="en-US"/>
           </a:p>
@@ -1160,7 +1160,7 @@
           <a:p>
             <a:fld id="{5ECBD1B4-F142-490E-A4AB-4FD38A88171A}" type="datetimeFigureOut">
               <a:rPr lang="en-US" smtClean="0"/>
-              <a:t>8/18/2021</a:t>
+              <a:t>8/19/2021</a:t>
             </a:fld>
             <a:endParaRPr lang="en-US"/>
           </a:p>
@@ -1425,7 +1425,7 @@
           <a:p>
             <a:fld id="{5ECBD1B4-F142-490E-A4AB-4FD38A88171A}" type="datetimeFigureOut">
               <a:rPr lang="en-US" smtClean="0"/>
-              <a:t>8/18/2021</a:t>
+              <a:t>8/19/2021</a:t>
             </a:fld>
             <a:endParaRPr lang="en-US"/>
           </a:p>
@@ -1837,7 +1837,7 @@
           <a:p>
             <a:fld id="{5ECBD1B4-F142-490E-A4AB-4FD38A88171A}" type="datetimeFigureOut">
               <a:rPr lang="en-US" smtClean="0"/>
-              <a:t>8/18/2021</a:t>
+              <a:t>8/19/2021</a:t>
             </a:fld>
             <a:endParaRPr lang="en-US"/>
           </a:p>
@@ -1978,7 +1978,7 @@
           <a:p>
             <a:fld id="{5ECBD1B4-F142-490E-A4AB-4FD38A88171A}" type="datetimeFigureOut">
               <a:rPr lang="en-US" smtClean="0"/>
-              <a:t>8/18/2021</a:t>
+              <a:t>8/19/2021</a:t>
             </a:fld>
             <a:endParaRPr lang="en-US"/>
           </a:p>
@@ -2091,7 +2091,7 @@
           <a:p>
             <a:fld id="{5ECBD1B4-F142-490E-A4AB-4FD38A88171A}" type="datetimeFigureOut">
               <a:rPr lang="en-US" smtClean="0"/>
-              <a:t>8/18/2021</a:t>
+              <a:t>8/19/2021</a:t>
             </a:fld>
             <a:endParaRPr lang="en-US"/>
           </a:p>
@@ -2402,7 +2402,7 @@
           <a:p>
             <a:fld id="{5ECBD1B4-F142-490E-A4AB-4FD38A88171A}" type="datetimeFigureOut">
               <a:rPr lang="en-US" smtClean="0"/>
-              <a:t>8/18/2021</a:t>
+              <a:t>8/19/2021</a:t>
             </a:fld>
             <a:endParaRPr lang="en-US"/>
           </a:p>
@@ -2690,7 +2690,7 @@
           <a:p>
             <a:fld id="{5ECBD1B4-F142-490E-A4AB-4FD38A88171A}" type="datetimeFigureOut">
               <a:rPr lang="en-US" smtClean="0"/>
-              <a:t>8/18/2021</a:t>
+              <a:t>8/19/2021</a:t>
             </a:fld>
             <a:endParaRPr lang="en-US"/>
           </a:p>
@@ -2931,7 +2931,7 @@
           <a:p>
             <a:fld id="{5ECBD1B4-F142-490E-A4AB-4FD38A88171A}" type="datetimeFigureOut">
               <a:rPr lang="en-US" smtClean="0"/>
-              <a:t>8/18/2021</a:t>
+              <a:t>8/19/2021</a:t>
             </a:fld>
             <a:endParaRPr lang="en-US"/>
           </a:p>
@@ -8563,14 +8563,21 @@
             <p:ph idx="1"/>
           </p:nvPr>
         </p:nvSpPr>
-        <p:spPr/>
-        <p:txBody>
-          <a:bodyPr/>
+        <p:spPr>
+          <a:xfrm>
+            <a:off x="838200" y="1825625"/>
+            <a:ext cx="10515600" cy="4912526"/>
+          </a:xfrm>
+        </p:spPr>
+        <p:txBody>
+          <a:bodyPr>
+            <a:normAutofit/>
+          </a:bodyPr>
           <a:lstStyle/>
           <a:p>
             <a:r>
               <a:rPr lang="en-US" dirty="0"/>
-              <a:t>Time optimization</a:t>
+              <a:t>Time optimization ???</a:t>
             </a:r>
           </a:p>
           <a:p>
@@ -8589,6 +8596,21 @@
             <a:r>
               <a:rPr lang="en-US" dirty="0"/>
               <a:t>DO NOT CHANGE ALL .CPU TO. GPU !!!</a:t>
+            </a:r>
+          </a:p>
+          <a:p>
+            <a:endParaRPr lang="en-US" dirty="0"/>
+          </a:p>
+          <a:p>
+            <a:r>
+              <a:rPr lang="en-US" dirty="0"/>
+              <a:t>Creating HD pictures takes the longest time ??????</a:t>
+            </a:r>
+          </a:p>
+          <a:p>
+            <a:r>
+              <a:rPr lang="en-US" dirty="0"/>
+              <a:t>Sometimes pushing to GPU is not recommended because not enough memory – ram better</a:t>
             </a:r>
           </a:p>
           <a:p>

</xml_diff>

<commit_message>
added test_original improved speed in PNG creator METRIC IS STILL WRONG
</commit_message>
<xml_diff>
--- a/misc/Segmentation.pptx
+++ b/misc/Segmentation.pptx
@@ -8793,6 +8793,35 @@
               <a:t>Visualized in 3D ???</a:t>
             </a:r>
           </a:p>
+          <a:p>
+            <a:endParaRPr lang="en-US" dirty="0"/>
+          </a:p>
+          <a:p>
+            <a:r>
+              <a:rPr lang="en-US" dirty="0"/>
+              <a:t>IMAGE CREATION TAKES THE LONGEST !!!!!!! (90%)</a:t>
+            </a:r>
+          </a:p>
+          <a:p>
+            <a:r>
+              <a:rPr lang="en-US" dirty="0"/>
+              <a:t>WORST case 25 min per picture</a:t>
+            </a:r>
+          </a:p>
+          <a:p>
+            <a:endParaRPr lang="en-US" dirty="0"/>
+          </a:p>
+          <a:p>
+            <a:r>
+              <a:rPr lang="en-US" dirty="0"/>
+              <a:t>Check evaluation </a:t>
+            </a:r>
+            <a:r>
+              <a:rPr lang="en-US" dirty="0" err="1"/>
+              <a:t>meric</a:t>
+            </a:r>
+            <a:endParaRPr lang="en-US" dirty="0"/>
+          </a:p>
         </p:txBody>
       </p:sp>
     </p:spTree>

</xml_diff>

<commit_message>
Pay attention to function soft_nms
</commit_message>
<xml_diff>
--- a/misc/Segmentation.pptx
+++ b/misc/Segmentation.pptx
@@ -282,7 +282,7 @@
           <a:p>
             <a:fld id="{5ECBD1B4-F142-490E-A4AB-4FD38A88171A}" type="datetimeFigureOut">
               <a:rPr lang="en-US" smtClean="0"/>
-              <a:t>8/24/2021</a:t>
+              <a:t>8/25/2021</a:t>
             </a:fld>
             <a:endParaRPr lang="en-US"/>
           </a:p>
@@ -480,7 +480,7 @@
           <a:p>
             <a:fld id="{5ECBD1B4-F142-490E-A4AB-4FD38A88171A}" type="datetimeFigureOut">
               <a:rPr lang="en-US" smtClean="0"/>
-              <a:t>8/24/2021</a:t>
+              <a:t>8/25/2021</a:t>
             </a:fld>
             <a:endParaRPr lang="en-US"/>
           </a:p>
@@ -688,7 +688,7 @@
           <a:p>
             <a:fld id="{5ECBD1B4-F142-490E-A4AB-4FD38A88171A}" type="datetimeFigureOut">
               <a:rPr lang="en-US" smtClean="0"/>
-              <a:t>8/24/2021</a:t>
+              <a:t>8/25/2021</a:t>
             </a:fld>
             <a:endParaRPr lang="en-US"/>
           </a:p>
@@ -886,7 +886,7 @@
           <a:p>
             <a:fld id="{5ECBD1B4-F142-490E-A4AB-4FD38A88171A}" type="datetimeFigureOut">
               <a:rPr lang="en-US" smtClean="0"/>
-              <a:t>8/24/2021</a:t>
+              <a:t>8/25/2021</a:t>
             </a:fld>
             <a:endParaRPr lang="en-US"/>
           </a:p>
@@ -1161,7 +1161,7 @@
           <a:p>
             <a:fld id="{5ECBD1B4-F142-490E-A4AB-4FD38A88171A}" type="datetimeFigureOut">
               <a:rPr lang="en-US" smtClean="0"/>
-              <a:t>8/24/2021</a:t>
+              <a:t>8/25/2021</a:t>
             </a:fld>
             <a:endParaRPr lang="en-US"/>
           </a:p>
@@ -1426,7 +1426,7 @@
           <a:p>
             <a:fld id="{5ECBD1B4-F142-490E-A4AB-4FD38A88171A}" type="datetimeFigureOut">
               <a:rPr lang="en-US" smtClean="0"/>
-              <a:t>8/24/2021</a:t>
+              <a:t>8/25/2021</a:t>
             </a:fld>
             <a:endParaRPr lang="en-US"/>
           </a:p>
@@ -1838,7 +1838,7 @@
           <a:p>
             <a:fld id="{5ECBD1B4-F142-490E-A4AB-4FD38A88171A}" type="datetimeFigureOut">
               <a:rPr lang="en-US" smtClean="0"/>
-              <a:t>8/24/2021</a:t>
+              <a:t>8/25/2021</a:t>
             </a:fld>
             <a:endParaRPr lang="en-US"/>
           </a:p>
@@ -1979,7 +1979,7 @@
           <a:p>
             <a:fld id="{5ECBD1B4-F142-490E-A4AB-4FD38A88171A}" type="datetimeFigureOut">
               <a:rPr lang="en-US" smtClean="0"/>
-              <a:t>8/24/2021</a:t>
+              <a:t>8/25/2021</a:t>
             </a:fld>
             <a:endParaRPr lang="en-US"/>
           </a:p>
@@ -2092,7 +2092,7 @@
           <a:p>
             <a:fld id="{5ECBD1B4-F142-490E-A4AB-4FD38A88171A}" type="datetimeFigureOut">
               <a:rPr lang="en-US" smtClean="0"/>
-              <a:t>8/24/2021</a:t>
+              <a:t>8/25/2021</a:t>
             </a:fld>
             <a:endParaRPr lang="en-US"/>
           </a:p>
@@ -2403,7 +2403,7 @@
           <a:p>
             <a:fld id="{5ECBD1B4-F142-490E-A4AB-4FD38A88171A}" type="datetimeFigureOut">
               <a:rPr lang="en-US" smtClean="0"/>
-              <a:t>8/24/2021</a:t>
+              <a:t>8/25/2021</a:t>
             </a:fld>
             <a:endParaRPr lang="en-US"/>
           </a:p>
@@ -2691,7 +2691,7 @@
           <a:p>
             <a:fld id="{5ECBD1B4-F142-490E-A4AB-4FD38A88171A}" type="datetimeFigureOut">
               <a:rPr lang="en-US" smtClean="0"/>
-              <a:t>8/24/2021</a:t>
+              <a:t>8/25/2021</a:t>
             </a:fld>
             <a:endParaRPr lang="en-US"/>
           </a:p>
@@ -2932,7 +2932,7 @@
           <a:p>
             <a:fld id="{5ECBD1B4-F142-490E-A4AB-4FD38A88171A}" type="datetimeFigureOut">
               <a:rPr lang="en-US" smtClean="0"/>
-              <a:t>8/24/2021</a:t>
+              <a:t>8/25/2021</a:t>
             </a:fld>
             <a:endParaRPr lang="en-US"/>
           </a:p>
@@ -8809,18 +8809,20 @@
             </a:r>
           </a:p>
           <a:p>
+            <a:pPr lvl="1"/>
+            <a:r>
+              <a:rPr lang="en-US" dirty="0"/>
+              <a:t>Can be reduced to 5 min in precision is not very important </a:t>
+            </a:r>
+          </a:p>
+          <a:p>
             <a:endParaRPr lang="en-US" dirty="0"/>
           </a:p>
           <a:p>
             <a:r>
               <a:rPr lang="en-US" dirty="0"/>
-              <a:t>Check evaluation </a:t>
-            </a:r>
-            <a:r>
-              <a:rPr lang="en-US" dirty="0" err="1"/>
-              <a:t>meric</a:t>
-            </a:r>
-            <a:endParaRPr lang="en-US" dirty="0"/>
+              <a:t>Check evaluation metric</a:t>
+            </a:r>
           </a:p>
         </p:txBody>
       </p:sp>

</xml_diff>

<commit_message>
impoved STL turner/STLturner.py added PPTX
</commit_message>
<xml_diff>
--- a/misc/Segmentation.pptx
+++ b/misc/Segmentation.pptx
@@ -282,7 +282,7 @@
           <a:p>
             <a:fld id="{5ECBD1B4-F142-490E-A4AB-4FD38A88171A}" type="datetimeFigureOut">
               <a:rPr lang="en-US" smtClean="0"/>
-              <a:t>8/25/2021</a:t>
+              <a:t>8/27/2021</a:t>
             </a:fld>
             <a:endParaRPr lang="en-US"/>
           </a:p>
@@ -480,7 +480,7 @@
           <a:p>
             <a:fld id="{5ECBD1B4-F142-490E-A4AB-4FD38A88171A}" type="datetimeFigureOut">
               <a:rPr lang="en-US" smtClean="0"/>
-              <a:t>8/25/2021</a:t>
+              <a:t>8/27/2021</a:t>
             </a:fld>
             <a:endParaRPr lang="en-US"/>
           </a:p>
@@ -688,7 +688,7 @@
           <a:p>
             <a:fld id="{5ECBD1B4-F142-490E-A4AB-4FD38A88171A}" type="datetimeFigureOut">
               <a:rPr lang="en-US" smtClean="0"/>
-              <a:t>8/25/2021</a:t>
+              <a:t>8/27/2021</a:t>
             </a:fld>
             <a:endParaRPr lang="en-US"/>
           </a:p>
@@ -886,7 +886,7 @@
           <a:p>
             <a:fld id="{5ECBD1B4-F142-490E-A4AB-4FD38A88171A}" type="datetimeFigureOut">
               <a:rPr lang="en-US" smtClean="0"/>
-              <a:t>8/25/2021</a:t>
+              <a:t>8/27/2021</a:t>
             </a:fld>
             <a:endParaRPr lang="en-US"/>
           </a:p>
@@ -1161,7 +1161,7 @@
           <a:p>
             <a:fld id="{5ECBD1B4-F142-490E-A4AB-4FD38A88171A}" type="datetimeFigureOut">
               <a:rPr lang="en-US" smtClean="0"/>
-              <a:t>8/25/2021</a:t>
+              <a:t>8/27/2021</a:t>
             </a:fld>
             <a:endParaRPr lang="en-US"/>
           </a:p>
@@ -1426,7 +1426,7 @@
           <a:p>
             <a:fld id="{5ECBD1B4-F142-490E-A4AB-4FD38A88171A}" type="datetimeFigureOut">
               <a:rPr lang="en-US" smtClean="0"/>
-              <a:t>8/25/2021</a:t>
+              <a:t>8/27/2021</a:t>
             </a:fld>
             <a:endParaRPr lang="en-US"/>
           </a:p>
@@ -1838,7 +1838,7 @@
           <a:p>
             <a:fld id="{5ECBD1B4-F142-490E-A4AB-4FD38A88171A}" type="datetimeFigureOut">
               <a:rPr lang="en-US" smtClean="0"/>
-              <a:t>8/25/2021</a:t>
+              <a:t>8/27/2021</a:t>
             </a:fld>
             <a:endParaRPr lang="en-US"/>
           </a:p>
@@ -1979,7 +1979,7 @@
           <a:p>
             <a:fld id="{5ECBD1B4-F142-490E-A4AB-4FD38A88171A}" type="datetimeFigureOut">
               <a:rPr lang="en-US" smtClean="0"/>
-              <a:t>8/25/2021</a:t>
+              <a:t>8/27/2021</a:t>
             </a:fld>
             <a:endParaRPr lang="en-US"/>
           </a:p>
@@ -2092,7 +2092,7 @@
           <a:p>
             <a:fld id="{5ECBD1B4-F142-490E-A4AB-4FD38A88171A}" type="datetimeFigureOut">
               <a:rPr lang="en-US" smtClean="0"/>
-              <a:t>8/25/2021</a:t>
+              <a:t>8/27/2021</a:t>
             </a:fld>
             <a:endParaRPr lang="en-US"/>
           </a:p>
@@ -2403,7 +2403,7 @@
           <a:p>
             <a:fld id="{5ECBD1B4-F142-490E-A4AB-4FD38A88171A}" type="datetimeFigureOut">
               <a:rPr lang="en-US" smtClean="0"/>
-              <a:t>8/25/2021</a:t>
+              <a:t>8/27/2021</a:t>
             </a:fld>
             <a:endParaRPr lang="en-US"/>
           </a:p>
@@ -2691,7 +2691,7 @@
           <a:p>
             <a:fld id="{5ECBD1B4-F142-490E-A4AB-4FD38A88171A}" type="datetimeFigureOut">
               <a:rPr lang="en-US" smtClean="0"/>
-              <a:t>8/25/2021</a:t>
+              <a:t>8/27/2021</a:t>
             </a:fld>
             <a:endParaRPr lang="en-US"/>
           </a:p>
@@ -2932,7 +2932,7 @@
           <a:p>
             <a:fld id="{5ECBD1B4-F142-490E-A4AB-4FD38A88171A}" type="datetimeFigureOut">
               <a:rPr lang="en-US" smtClean="0"/>
-              <a:t>8/25/2021</a:t>
+              <a:t>8/27/2021</a:t>
             </a:fld>
             <a:endParaRPr lang="en-US"/>
           </a:p>
@@ -4662,7 +4662,7 @@
         </p:nvSpPr>
         <p:spPr>
           <a:xfrm>
-            <a:off x="1358283" y="4358936"/>
+            <a:off x="1362919" y="4367813"/>
             <a:ext cx="790113" cy="221942"/>
           </a:xfrm>
           <a:prstGeom prst="rightArrow">

</xml_diff>